<commit_message>
Created some bar codes
</commit_message>
<xml_diff>
--- a/public/images/Art.pptx
+++ b/public/images/Art.pptx
@@ -5,10 +5,11 @@
     <p:sldMasterId id="2147483648" r:id="rId1"/>
   </p:sldMasterIdLst>
   <p:sldIdLst>
-    <p:sldId id="256" r:id="rId2"/>
+    <p:sldId id="257" r:id="rId2"/>
+    <p:sldId id="256" r:id="rId3"/>
   </p:sldIdLst>
   <p:sldSz cx="12192000" cy="6858000"/>
-  <p:notesSz cx="6858000" cy="9144000"/>
+  <p:notesSz cx="7315200" cy="9601200"/>
   <p:defaultTextStyle>
     <a:defPPr>
       <a:defRPr lang="en-US"/>
@@ -3305,6 +3306,1778 @@
 </file>
 
 <file path=ppt/slides/slide1.xml><?xml version="1.0" encoding="utf-8"?>
+<p:sld xmlns:a="http://schemas.openxmlformats.org/drawingml/2006/main" xmlns:r="http://schemas.openxmlformats.org/officeDocument/2006/relationships" xmlns:p="http://schemas.openxmlformats.org/presentationml/2006/main">
+  <p:cSld>
+    <p:spTree>
+      <p:nvGrpSpPr>
+        <p:cNvPr id="1" name=""/>
+        <p:cNvGrpSpPr/>
+        <p:nvPr/>
+      </p:nvGrpSpPr>
+      <p:grpSpPr>
+        <a:xfrm>
+          <a:off x="0" y="0"/>
+          <a:ext cx="0" cy="0"/>
+          <a:chOff x="0" y="0"/>
+          <a:chExt cx="0" cy="0"/>
+        </a:xfrm>
+      </p:grpSpPr>
+      <p:grpSp>
+        <p:nvGrpSpPr>
+          <p:cNvPr id="66" name="Group 65">
+            <a:extLst>
+              <a:ext uri="{FF2B5EF4-FFF2-40B4-BE49-F238E27FC236}">
+                <a16:creationId xmlns:a16="http://schemas.microsoft.com/office/drawing/2014/main" id="{CC23E40D-D997-D845-4B2D-2022A15C6D80}"/>
+              </a:ext>
+            </a:extLst>
+          </p:cNvPr>
+          <p:cNvGrpSpPr/>
+          <p:nvPr/>
+        </p:nvGrpSpPr>
+        <p:grpSpPr>
+          <a:xfrm rot="21265644">
+            <a:off x="10316876" y="493137"/>
+            <a:ext cx="1705213" cy="2086266"/>
+            <a:chOff x="303093" y="245917"/>
+            <a:chExt cx="1705213" cy="2086266"/>
+          </a:xfrm>
+        </p:grpSpPr>
+        <p:pic>
+          <p:nvPicPr>
+            <p:cNvPr id="5" name="Picture 4">
+              <a:extLst>
+                <a:ext uri="{FF2B5EF4-FFF2-40B4-BE49-F238E27FC236}">
+                  <a16:creationId xmlns:a16="http://schemas.microsoft.com/office/drawing/2014/main" id="{F465C325-FAD0-C849-151B-5ADA17CC9C48}"/>
+                </a:ext>
+              </a:extLst>
+            </p:cNvPr>
+            <p:cNvPicPr>
+              <a:picLocks noChangeAspect="1"/>
+            </p:cNvPicPr>
+            <p:nvPr/>
+          </p:nvPicPr>
+          <p:blipFill>
+            <a:blip r:embed="rId2"/>
+            <a:stretch>
+              <a:fillRect/>
+            </a:stretch>
+          </p:blipFill>
+          <p:spPr>
+            <a:xfrm>
+              <a:off x="303093" y="245917"/>
+              <a:ext cx="1705213" cy="2086266"/>
+            </a:xfrm>
+            <a:prstGeom prst="rect">
+              <a:avLst/>
+            </a:prstGeom>
+          </p:spPr>
+        </p:pic>
+        <p:sp>
+          <p:nvSpPr>
+            <p:cNvPr id="6" name="Rectangle 5">
+              <a:extLst>
+                <a:ext uri="{FF2B5EF4-FFF2-40B4-BE49-F238E27FC236}">
+                  <a16:creationId xmlns:a16="http://schemas.microsoft.com/office/drawing/2014/main" id="{9C4C5C9D-2F87-7452-B641-300ECEE07D0C}"/>
+                </a:ext>
+              </a:extLst>
+            </p:cNvPr>
+            <p:cNvSpPr/>
+            <p:nvPr/>
+          </p:nvSpPr>
+          <p:spPr>
+            <a:xfrm>
+              <a:off x="527050" y="1962150"/>
+              <a:ext cx="1238250" cy="285750"/>
+            </a:xfrm>
+            <a:prstGeom prst="rect">
+              <a:avLst/>
+            </a:prstGeom>
+            <a:solidFill>
+              <a:schemeClr val="tx1"/>
+            </a:solidFill>
+            <a:ln>
+              <a:noFill/>
+            </a:ln>
+          </p:spPr>
+          <p:style>
+            <a:lnRef idx="2">
+              <a:schemeClr val="accent1">
+                <a:shade val="15000"/>
+              </a:schemeClr>
+            </a:lnRef>
+            <a:fillRef idx="1">
+              <a:schemeClr val="accent1"/>
+            </a:fillRef>
+            <a:effectRef idx="0">
+              <a:schemeClr val="accent1"/>
+            </a:effectRef>
+            <a:fontRef idx="minor">
+              <a:schemeClr val="lt1"/>
+            </a:fontRef>
+          </p:style>
+          <p:txBody>
+            <a:bodyPr rtlCol="0" anchor="ctr"/>
+            <a:lstStyle/>
+            <a:p>
+              <a:pPr algn="ctr"/>
+              <a:r>
+                <a:rPr lang="en-US" sz="2400" dirty="0"/>
+                <a:t>Eat me</a:t>
+              </a:r>
+            </a:p>
+          </p:txBody>
+        </p:sp>
+      </p:grpSp>
+      <p:grpSp>
+        <p:nvGrpSpPr>
+          <p:cNvPr id="84" name="Group 83">
+            <a:extLst>
+              <a:ext uri="{FF2B5EF4-FFF2-40B4-BE49-F238E27FC236}">
+                <a16:creationId xmlns:a16="http://schemas.microsoft.com/office/drawing/2014/main" id="{FB9A301C-6F7F-0AAE-9022-275A991F8335}"/>
+              </a:ext>
+            </a:extLst>
+          </p:cNvPr>
+          <p:cNvGrpSpPr/>
+          <p:nvPr/>
+        </p:nvGrpSpPr>
+        <p:grpSpPr>
+          <a:xfrm rot="21309425">
+            <a:off x="3096829" y="3894478"/>
+            <a:ext cx="1616725" cy="2330240"/>
+            <a:chOff x="8648700" y="-192586"/>
+            <a:chExt cx="1907916" cy="2749943"/>
+          </a:xfrm>
+        </p:grpSpPr>
+        <p:grpSp>
+          <p:nvGrpSpPr>
+            <p:cNvPr id="61" name="Group 60">
+              <a:extLst>
+                <a:ext uri="{FF2B5EF4-FFF2-40B4-BE49-F238E27FC236}">
+                  <a16:creationId xmlns:a16="http://schemas.microsoft.com/office/drawing/2014/main" id="{E87886B6-6BF8-0EF2-7B08-B26482B9AD69}"/>
+                </a:ext>
+              </a:extLst>
+            </p:cNvPr>
+            <p:cNvGrpSpPr/>
+            <p:nvPr/>
+          </p:nvGrpSpPr>
+          <p:grpSpPr>
+            <a:xfrm>
+              <a:off x="8648700" y="-192586"/>
+              <a:ext cx="1907916" cy="2749943"/>
+              <a:chOff x="8648700" y="-192586"/>
+              <a:chExt cx="1907916" cy="2749943"/>
+            </a:xfrm>
+          </p:grpSpPr>
+          <p:grpSp>
+            <p:nvGrpSpPr>
+              <p:cNvPr id="31" name="Group 30">
+                <a:extLst>
+                  <a:ext uri="{FF2B5EF4-FFF2-40B4-BE49-F238E27FC236}">
+                    <a16:creationId xmlns:a16="http://schemas.microsoft.com/office/drawing/2014/main" id="{B4DB0E02-5E54-803E-4375-1BB605DFBD95}"/>
+                  </a:ext>
+                </a:extLst>
+              </p:cNvPr>
+              <p:cNvGrpSpPr/>
+              <p:nvPr/>
+            </p:nvGrpSpPr>
+            <p:grpSpPr>
+              <a:xfrm>
+                <a:off x="8648700" y="-192586"/>
+                <a:ext cx="1907916" cy="2749943"/>
+                <a:chOff x="9512695" y="1035051"/>
+                <a:chExt cx="1273231" cy="1835150"/>
+              </a:xfrm>
+            </p:grpSpPr>
+            <p:pic>
+              <p:nvPicPr>
+                <p:cNvPr id="18" name="Picture 17" descr="A qr code on a box&#10;&#10;AI-generated content may be incorrect.">
+                  <a:extLst>
+                    <a:ext uri="{FF2B5EF4-FFF2-40B4-BE49-F238E27FC236}">
+                      <a16:creationId xmlns:a16="http://schemas.microsoft.com/office/drawing/2014/main" id="{1980DF06-227E-40BA-3F82-4FAB1A3A2306}"/>
+                    </a:ext>
+                  </a:extLst>
+                </p:cNvPr>
+                <p:cNvPicPr>
+                  <a:picLocks noChangeAspect="1"/>
+                </p:cNvPicPr>
+                <p:nvPr/>
+              </p:nvPicPr>
+              <p:blipFill>
+                <a:blip r:embed="rId3">
+                  <a:extLst>
+                    <a:ext uri="{28A0092B-C50C-407E-A947-70E740481C1C}">
+                      <a14:useLocalDpi xmlns:a14="http://schemas.microsoft.com/office/drawing/2010/main" val="0"/>
+                    </a:ext>
+                  </a:extLst>
+                </a:blip>
+                <a:stretch>
+                  <a:fillRect/>
+                </a:stretch>
+              </p:blipFill>
+              <p:spPr>
+                <a:xfrm>
+                  <a:off x="9512695" y="1035051"/>
+                  <a:ext cx="1273231" cy="1835150"/>
+                </a:xfrm>
+                <a:prstGeom prst="rect">
+                  <a:avLst/>
+                </a:prstGeom>
+              </p:spPr>
+            </p:pic>
+            <p:sp>
+              <p:nvSpPr>
+                <p:cNvPr id="30" name="Rectangle 29">
+                  <a:extLst>
+                    <a:ext uri="{FF2B5EF4-FFF2-40B4-BE49-F238E27FC236}">
+                      <a16:creationId xmlns:a16="http://schemas.microsoft.com/office/drawing/2014/main" id="{A181F00E-C49F-CF66-174A-D864DBBD5ED3}"/>
+                    </a:ext>
+                  </a:extLst>
+                </p:cNvPr>
+                <p:cNvSpPr/>
+                <p:nvPr/>
+              </p:nvSpPr>
+              <p:spPr>
+                <a:xfrm>
+                  <a:off x="9613804" y="1419226"/>
+                  <a:ext cx="1071012" cy="285750"/>
+                </a:xfrm>
+                <a:prstGeom prst="rect">
+                  <a:avLst/>
+                </a:prstGeom>
+                <a:solidFill>
+                  <a:schemeClr val="tx1"/>
+                </a:solidFill>
+                <a:ln>
+                  <a:noFill/>
+                </a:ln>
+              </p:spPr>
+              <p:style>
+                <a:lnRef idx="2">
+                  <a:schemeClr val="accent1">
+                    <a:shade val="15000"/>
+                  </a:schemeClr>
+                </a:lnRef>
+                <a:fillRef idx="1">
+                  <a:schemeClr val="accent1"/>
+                </a:fillRef>
+                <a:effectRef idx="0">
+                  <a:schemeClr val="accent1"/>
+                </a:effectRef>
+                <a:fontRef idx="minor">
+                  <a:schemeClr val="lt1"/>
+                </a:fontRef>
+              </p:style>
+              <p:txBody>
+                <a:bodyPr rtlCol="0" anchor="ctr"/>
+                <a:lstStyle/>
+                <a:p>
+                  <a:pPr algn="ctr"/>
+                  <a:r>
+                    <a:rPr lang="en-US" sz="2000" i="1" dirty="0"/>
+                    <a:t>Eat me</a:t>
+                  </a:r>
+                </a:p>
+              </p:txBody>
+            </p:sp>
+          </p:grpSp>
+          <p:sp>
+            <p:nvSpPr>
+              <p:cNvPr id="58" name="Rectangle 57">
+                <a:extLst>
+                  <a:ext uri="{FF2B5EF4-FFF2-40B4-BE49-F238E27FC236}">
+                    <a16:creationId xmlns:a16="http://schemas.microsoft.com/office/drawing/2014/main" id="{C1784284-0113-6B92-F660-A9061E6DD2E2}"/>
+                  </a:ext>
+                </a:extLst>
+              </p:cNvPr>
+              <p:cNvSpPr/>
+              <p:nvPr/>
+            </p:nvSpPr>
+            <p:spPr>
+              <a:xfrm>
+                <a:off x="8928240" y="1066522"/>
+                <a:ext cx="1348833" cy="1352550"/>
+              </a:xfrm>
+              <a:prstGeom prst="rect">
+                <a:avLst/>
+              </a:prstGeom>
+              <a:solidFill>
+                <a:schemeClr val="bg1"/>
+              </a:solidFill>
+              <a:ln>
+                <a:noFill/>
+              </a:ln>
+            </p:spPr>
+            <p:style>
+              <a:lnRef idx="2">
+                <a:schemeClr val="accent1">
+                  <a:shade val="15000"/>
+                </a:schemeClr>
+              </a:lnRef>
+              <a:fillRef idx="1">
+                <a:schemeClr val="accent1"/>
+              </a:fillRef>
+              <a:effectRef idx="0">
+                <a:schemeClr val="accent1"/>
+              </a:effectRef>
+              <a:fontRef idx="minor">
+                <a:schemeClr val="lt1"/>
+              </a:fontRef>
+            </p:style>
+            <p:txBody>
+              <a:bodyPr rtlCol="0" anchor="ctr"/>
+              <a:lstStyle/>
+              <a:p>
+                <a:pPr algn="ctr"/>
+                <a:endParaRPr lang="en-US"/>
+              </a:p>
+            </p:txBody>
+          </p:sp>
+        </p:grpSp>
+        <p:pic>
+          <p:nvPicPr>
+            <p:cNvPr id="36" name="Picture 35" descr="A qr code with a white background&#10;&#10;AI-generated content may be incorrect.">
+              <a:extLst>
+                <a:ext uri="{FF2B5EF4-FFF2-40B4-BE49-F238E27FC236}">
+                  <a16:creationId xmlns:a16="http://schemas.microsoft.com/office/drawing/2014/main" id="{CB10A8AD-F03A-05FB-E908-C3B417DBCC08}"/>
+                </a:ext>
+              </a:extLst>
+            </p:cNvPr>
+            <p:cNvPicPr>
+              <a:picLocks noChangeAspect="1"/>
+            </p:cNvPicPr>
+            <p:nvPr/>
+          </p:nvPicPr>
+          <p:blipFill>
+            <a:blip r:embed="rId4">
+              <a:extLst>
+                <a:ext uri="{28A0092B-C50C-407E-A947-70E740481C1C}">
+                  <a14:useLocalDpi xmlns:a14="http://schemas.microsoft.com/office/drawing/2010/main" val="0"/>
+                </a:ext>
+              </a:extLst>
+            </a:blip>
+            <a:stretch>
+              <a:fillRect/>
+            </a:stretch>
+          </p:blipFill>
+          <p:spPr>
+            <a:xfrm>
+              <a:off x="8848242" y="987350"/>
+              <a:ext cx="1514550" cy="1514550"/>
+            </a:xfrm>
+            <a:prstGeom prst="rect">
+              <a:avLst/>
+            </a:prstGeom>
+          </p:spPr>
+        </p:pic>
+      </p:grpSp>
+      <p:grpSp>
+        <p:nvGrpSpPr>
+          <p:cNvPr id="87" name="Group 86">
+            <a:extLst>
+              <a:ext uri="{FF2B5EF4-FFF2-40B4-BE49-F238E27FC236}">
+                <a16:creationId xmlns:a16="http://schemas.microsoft.com/office/drawing/2014/main" id="{ED3061A9-5687-19C2-6885-837B75D595E6}"/>
+              </a:ext>
+            </a:extLst>
+          </p:cNvPr>
+          <p:cNvGrpSpPr/>
+          <p:nvPr/>
+        </p:nvGrpSpPr>
+        <p:grpSpPr>
+          <a:xfrm>
+            <a:off x="4894256" y="3131186"/>
+            <a:ext cx="2637903" cy="2549973"/>
+            <a:chOff x="4717815" y="3343378"/>
+            <a:chExt cx="2637903" cy="2549973"/>
+          </a:xfrm>
+        </p:grpSpPr>
+        <p:grpSp>
+          <p:nvGrpSpPr>
+            <p:cNvPr id="60" name="Group 59">
+              <a:extLst>
+                <a:ext uri="{FF2B5EF4-FFF2-40B4-BE49-F238E27FC236}">
+                  <a16:creationId xmlns:a16="http://schemas.microsoft.com/office/drawing/2014/main" id="{8D24D92C-744F-5A68-480C-28C2270467CE}"/>
+                </a:ext>
+              </a:extLst>
+            </p:cNvPr>
+            <p:cNvGrpSpPr/>
+            <p:nvPr/>
+          </p:nvGrpSpPr>
+          <p:grpSpPr>
+            <a:xfrm>
+              <a:off x="4717815" y="3343378"/>
+              <a:ext cx="2637903" cy="2549973"/>
+              <a:chOff x="4717815" y="3343378"/>
+              <a:chExt cx="2637903" cy="2549973"/>
+            </a:xfrm>
+          </p:grpSpPr>
+          <p:pic>
+            <p:nvPicPr>
+              <p:cNvPr id="14" name="Picture 13" descr="A qr code with a leaf and thumbs up&#10;&#10;AI-generated content may be incorrect.">
+                <a:extLst>
+                  <a:ext uri="{FF2B5EF4-FFF2-40B4-BE49-F238E27FC236}">
+                    <a16:creationId xmlns:a16="http://schemas.microsoft.com/office/drawing/2014/main" id="{7B4CC0EA-7DF2-C88C-8F8E-A624F1D9C8E8}"/>
+                  </a:ext>
+                </a:extLst>
+              </p:cNvPr>
+              <p:cNvPicPr>
+                <a:picLocks noChangeAspect="1"/>
+              </p:cNvPicPr>
+              <p:nvPr/>
+            </p:nvPicPr>
+            <p:blipFill>
+              <a:blip r:embed="rId5">
+                <a:extLst>
+                  <a:ext uri="{28A0092B-C50C-407E-A947-70E740481C1C}">
+                    <a14:useLocalDpi xmlns:a14="http://schemas.microsoft.com/office/drawing/2010/main" val="0"/>
+                  </a:ext>
+                </a:extLst>
+              </a:blip>
+              <a:stretch>
+                <a:fillRect/>
+              </a:stretch>
+            </p:blipFill>
+            <p:spPr>
+              <a:xfrm>
+                <a:off x="4717815" y="3343378"/>
+                <a:ext cx="2637903" cy="2549973"/>
+              </a:xfrm>
+              <a:prstGeom prst="rect">
+                <a:avLst/>
+              </a:prstGeom>
+            </p:spPr>
+          </p:pic>
+          <p:sp>
+            <p:nvSpPr>
+              <p:cNvPr id="57" name="Rectangle 56">
+                <a:extLst>
+                  <a:ext uri="{FF2B5EF4-FFF2-40B4-BE49-F238E27FC236}">
+                    <a16:creationId xmlns:a16="http://schemas.microsoft.com/office/drawing/2014/main" id="{D406ABEC-3173-88C7-FB6E-51C30ADFBD5C}"/>
+                  </a:ext>
+                </a:extLst>
+              </p:cNvPr>
+              <p:cNvSpPr/>
+              <p:nvPr/>
+            </p:nvSpPr>
+            <p:spPr>
+              <a:xfrm>
+                <a:off x="5359400" y="3919890"/>
+                <a:ext cx="1348833" cy="1352550"/>
+              </a:xfrm>
+              <a:prstGeom prst="rect">
+                <a:avLst/>
+              </a:prstGeom>
+              <a:solidFill>
+                <a:schemeClr val="bg1"/>
+              </a:solidFill>
+              <a:ln>
+                <a:noFill/>
+              </a:ln>
+            </p:spPr>
+            <p:style>
+              <a:lnRef idx="2">
+                <a:schemeClr val="accent1">
+                  <a:shade val="15000"/>
+                </a:schemeClr>
+              </a:lnRef>
+              <a:fillRef idx="1">
+                <a:schemeClr val="accent1"/>
+              </a:fillRef>
+              <a:effectRef idx="0">
+                <a:schemeClr val="accent1"/>
+              </a:effectRef>
+              <a:fontRef idx="minor">
+                <a:schemeClr val="lt1"/>
+              </a:fontRef>
+            </p:style>
+            <p:txBody>
+              <a:bodyPr rtlCol="0" anchor="ctr"/>
+              <a:lstStyle/>
+              <a:p>
+                <a:pPr algn="ctr"/>
+                <a:endParaRPr lang="en-US"/>
+              </a:p>
+            </p:txBody>
+          </p:sp>
+        </p:grpSp>
+        <p:pic>
+          <p:nvPicPr>
+            <p:cNvPr id="38" name="Picture 37" descr="A qr code with a white background&#10;&#10;AI-generated content may be incorrect.">
+              <a:extLst>
+                <a:ext uri="{FF2B5EF4-FFF2-40B4-BE49-F238E27FC236}">
+                  <a16:creationId xmlns:a16="http://schemas.microsoft.com/office/drawing/2014/main" id="{97BF73EC-EE1D-77E7-1BE6-1AE26AA1F1C1}"/>
+                </a:ext>
+              </a:extLst>
+            </p:cNvPr>
+            <p:cNvPicPr>
+              <a:picLocks noChangeAspect="1"/>
+            </p:cNvPicPr>
+            <p:nvPr/>
+          </p:nvPicPr>
+          <p:blipFill>
+            <a:blip r:embed="rId6">
+              <a:extLst>
+                <a:ext uri="{28A0092B-C50C-407E-A947-70E740481C1C}">
+                  <a14:useLocalDpi xmlns:a14="http://schemas.microsoft.com/office/drawing/2010/main" val="0"/>
+                </a:ext>
+              </a:extLst>
+            </a:blip>
+            <a:stretch>
+              <a:fillRect/>
+            </a:stretch>
+          </p:blipFill>
+          <p:spPr>
+            <a:xfrm>
+              <a:off x="5199489" y="3791403"/>
+              <a:ext cx="1680847" cy="1680847"/>
+            </a:xfrm>
+            <a:prstGeom prst="rect">
+              <a:avLst/>
+            </a:prstGeom>
+          </p:spPr>
+        </p:pic>
+      </p:grpSp>
+      <p:pic>
+        <p:nvPicPr>
+          <p:cNvPr id="40" name="Picture 39" descr="A qr code on a white background&#10;&#10;AI-generated content may be incorrect.">
+            <a:extLst>
+              <a:ext uri="{FF2B5EF4-FFF2-40B4-BE49-F238E27FC236}">
+                <a16:creationId xmlns:a16="http://schemas.microsoft.com/office/drawing/2014/main" id="{B6565BDC-C239-ED6A-A79F-748E13321DD1}"/>
+              </a:ext>
+            </a:extLst>
+          </p:cNvPr>
+          <p:cNvPicPr>
+            <a:picLocks noChangeAspect="1"/>
+          </p:cNvPicPr>
+          <p:nvPr/>
+        </p:nvPicPr>
+        <p:blipFill>
+          <a:blip r:embed="rId7">
+            <a:extLst>
+              <a:ext uri="{28A0092B-C50C-407E-A947-70E740481C1C}">
+                <a14:useLocalDpi xmlns:a14="http://schemas.microsoft.com/office/drawing/2010/main" val="0"/>
+              </a:ext>
+            </a:extLst>
+          </a:blip>
+          <a:stretch>
+            <a:fillRect/>
+          </a:stretch>
+        </p:blipFill>
+        <p:spPr>
+          <a:xfrm rot="8100000">
+            <a:off x="495120" y="525611"/>
+            <a:ext cx="1624912" cy="1624912"/>
+          </a:xfrm>
+          <a:prstGeom prst="rect">
+            <a:avLst/>
+          </a:prstGeom>
+        </p:spPr>
+      </p:pic>
+      <p:grpSp>
+        <p:nvGrpSpPr>
+          <p:cNvPr id="81" name="Group 80">
+            <a:extLst>
+              <a:ext uri="{FF2B5EF4-FFF2-40B4-BE49-F238E27FC236}">
+                <a16:creationId xmlns:a16="http://schemas.microsoft.com/office/drawing/2014/main" id="{D84CDB7A-2D7D-EFEA-0713-BCD7BB8585E1}"/>
+              </a:ext>
+            </a:extLst>
+          </p:cNvPr>
+          <p:cNvGrpSpPr/>
+          <p:nvPr/>
+        </p:nvGrpSpPr>
+        <p:grpSpPr>
+          <a:xfrm rot="21130560">
+            <a:off x="2522251" y="434420"/>
+            <a:ext cx="1705213" cy="2086266"/>
+            <a:chOff x="2443043" y="245917"/>
+            <a:chExt cx="1705213" cy="2086266"/>
+          </a:xfrm>
+        </p:grpSpPr>
+        <p:grpSp>
+          <p:nvGrpSpPr>
+            <p:cNvPr id="65" name="Group 64">
+              <a:extLst>
+                <a:ext uri="{FF2B5EF4-FFF2-40B4-BE49-F238E27FC236}">
+                  <a16:creationId xmlns:a16="http://schemas.microsoft.com/office/drawing/2014/main" id="{EB9F2022-D83E-38B3-1424-5253A4F3D5D7}"/>
+                </a:ext>
+              </a:extLst>
+            </p:cNvPr>
+            <p:cNvGrpSpPr/>
+            <p:nvPr/>
+          </p:nvGrpSpPr>
+          <p:grpSpPr>
+            <a:xfrm>
+              <a:off x="2443043" y="245917"/>
+              <a:ext cx="1705213" cy="2086266"/>
+              <a:chOff x="2443043" y="245917"/>
+              <a:chExt cx="1705213" cy="2086266"/>
+            </a:xfrm>
+          </p:grpSpPr>
+          <p:pic>
+            <p:nvPicPr>
+              <p:cNvPr id="62" name="Picture 61">
+                <a:extLst>
+                  <a:ext uri="{FF2B5EF4-FFF2-40B4-BE49-F238E27FC236}">
+                    <a16:creationId xmlns:a16="http://schemas.microsoft.com/office/drawing/2014/main" id="{995AB9DB-B53B-1854-A734-0BECA266D1D7}"/>
+                  </a:ext>
+                </a:extLst>
+              </p:cNvPr>
+              <p:cNvPicPr>
+                <a:picLocks noChangeAspect="1"/>
+              </p:cNvPicPr>
+              <p:nvPr/>
+            </p:nvPicPr>
+            <p:blipFill>
+              <a:blip r:embed="rId2"/>
+              <a:stretch>
+                <a:fillRect/>
+              </a:stretch>
+            </p:blipFill>
+            <p:spPr>
+              <a:xfrm>
+                <a:off x="2443043" y="245917"/>
+                <a:ext cx="1705213" cy="2086266"/>
+              </a:xfrm>
+              <a:prstGeom prst="rect">
+                <a:avLst/>
+              </a:prstGeom>
+            </p:spPr>
+          </p:pic>
+          <p:sp>
+            <p:nvSpPr>
+              <p:cNvPr id="63" name="Rectangle 62">
+                <a:extLst>
+                  <a:ext uri="{FF2B5EF4-FFF2-40B4-BE49-F238E27FC236}">
+                    <a16:creationId xmlns:a16="http://schemas.microsoft.com/office/drawing/2014/main" id="{33782612-2297-AFAD-940A-027A84909A00}"/>
+                  </a:ext>
+                </a:extLst>
+              </p:cNvPr>
+              <p:cNvSpPr/>
+              <p:nvPr/>
+            </p:nvSpPr>
+            <p:spPr>
+              <a:xfrm>
+                <a:off x="2584450" y="390246"/>
+                <a:ext cx="1401222" cy="1425853"/>
+              </a:xfrm>
+              <a:prstGeom prst="rect">
+                <a:avLst/>
+              </a:prstGeom>
+              <a:solidFill>
+                <a:schemeClr val="bg1"/>
+              </a:solidFill>
+              <a:ln>
+                <a:noFill/>
+              </a:ln>
+            </p:spPr>
+            <p:style>
+              <a:lnRef idx="2">
+                <a:schemeClr val="accent1">
+                  <a:shade val="15000"/>
+                </a:schemeClr>
+              </a:lnRef>
+              <a:fillRef idx="1">
+                <a:schemeClr val="accent1"/>
+              </a:fillRef>
+              <a:effectRef idx="0">
+                <a:schemeClr val="accent1"/>
+              </a:effectRef>
+              <a:fontRef idx="minor">
+                <a:schemeClr val="lt1"/>
+              </a:fontRef>
+            </p:style>
+            <p:txBody>
+              <a:bodyPr rtlCol="0" anchor="ctr"/>
+              <a:lstStyle/>
+              <a:p>
+                <a:pPr algn="ctr"/>
+                <a:endParaRPr lang="en-US" dirty="0"/>
+              </a:p>
+            </p:txBody>
+          </p:sp>
+          <p:sp>
+            <p:nvSpPr>
+              <p:cNvPr id="64" name="Rectangle 63">
+                <a:extLst>
+                  <a:ext uri="{FF2B5EF4-FFF2-40B4-BE49-F238E27FC236}">
+                    <a16:creationId xmlns:a16="http://schemas.microsoft.com/office/drawing/2014/main" id="{676F98E1-113B-5037-4C19-7564B1237A33}"/>
+                  </a:ext>
+                </a:extLst>
+              </p:cNvPr>
+              <p:cNvSpPr/>
+              <p:nvPr/>
+            </p:nvSpPr>
+            <p:spPr>
+              <a:xfrm>
+                <a:off x="2665936" y="1962150"/>
+                <a:ext cx="1238250" cy="285750"/>
+              </a:xfrm>
+              <a:prstGeom prst="rect">
+                <a:avLst/>
+              </a:prstGeom>
+              <a:solidFill>
+                <a:schemeClr val="tx1"/>
+              </a:solidFill>
+              <a:ln>
+                <a:noFill/>
+              </a:ln>
+            </p:spPr>
+            <p:style>
+              <a:lnRef idx="2">
+                <a:schemeClr val="accent1">
+                  <a:shade val="15000"/>
+                </a:schemeClr>
+              </a:lnRef>
+              <a:fillRef idx="1">
+                <a:schemeClr val="accent1"/>
+              </a:fillRef>
+              <a:effectRef idx="0">
+                <a:schemeClr val="accent1"/>
+              </a:effectRef>
+              <a:fontRef idx="minor">
+                <a:schemeClr val="lt1"/>
+              </a:fontRef>
+            </p:style>
+            <p:txBody>
+              <a:bodyPr rtlCol="0" anchor="ctr"/>
+              <a:lstStyle/>
+              <a:p>
+                <a:pPr algn="ctr"/>
+                <a:r>
+                  <a:rPr lang="en-US" sz="2400" dirty="0"/>
+                  <a:t>Eat me</a:t>
+                </a:r>
+              </a:p>
+            </p:txBody>
+          </p:sp>
+        </p:grpSp>
+        <p:pic>
+          <p:nvPicPr>
+            <p:cNvPr id="42" name="Picture 41" descr="A qr code with a white background&#10;&#10;AI-generated content may be incorrect.">
+              <a:extLst>
+                <a:ext uri="{FF2B5EF4-FFF2-40B4-BE49-F238E27FC236}">
+                  <a16:creationId xmlns:a16="http://schemas.microsoft.com/office/drawing/2014/main" id="{E338D79B-FBB8-38B5-B1E9-4F0D32AA84FF}"/>
+                </a:ext>
+              </a:extLst>
+            </p:cNvPr>
+            <p:cNvPicPr>
+              <a:picLocks noChangeAspect="1"/>
+            </p:cNvPicPr>
+            <p:nvPr/>
+          </p:nvPicPr>
+          <p:blipFill>
+            <a:blip r:embed="rId8">
+              <a:extLst>
+                <a:ext uri="{28A0092B-C50C-407E-A947-70E740481C1C}">
+                  <a14:useLocalDpi xmlns:a14="http://schemas.microsoft.com/office/drawing/2010/main" val="0"/>
+                </a:ext>
+              </a:extLst>
+            </a:blip>
+            <a:stretch>
+              <a:fillRect/>
+            </a:stretch>
+          </p:blipFill>
+          <p:spPr>
+            <a:xfrm>
+              <a:off x="2529760" y="350332"/>
+              <a:ext cx="1521966" cy="1521966"/>
+            </a:xfrm>
+            <a:prstGeom prst="rect">
+              <a:avLst/>
+            </a:prstGeom>
+          </p:spPr>
+        </p:pic>
+      </p:grpSp>
+      <p:grpSp>
+        <p:nvGrpSpPr>
+          <p:cNvPr id="82" name="Group 81">
+            <a:extLst>
+              <a:ext uri="{FF2B5EF4-FFF2-40B4-BE49-F238E27FC236}">
+                <a16:creationId xmlns:a16="http://schemas.microsoft.com/office/drawing/2014/main" id="{BBC5EF4F-A402-E5C7-9FD6-35FCF0D3783C}"/>
+              </a:ext>
+            </a:extLst>
+          </p:cNvPr>
+          <p:cNvGrpSpPr/>
+          <p:nvPr/>
+        </p:nvGrpSpPr>
+        <p:grpSpPr>
+          <a:xfrm rot="423697">
+            <a:off x="5088490" y="656882"/>
+            <a:ext cx="1705213" cy="2086266"/>
+            <a:chOff x="4473258" y="245917"/>
+            <a:chExt cx="1705213" cy="2086266"/>
+          </a:xfrm>
+        </p:grpSpPr>
+        <p:grpSp>
+          <p:nvGrpSpPr>
+            <p:cNvPr id="77" name="Group 76">
+              <a:extLst>
+                <a:ext uri="{FF2B5EF4-FFF2-40B4-BE49-F238E27FC236}">
+                  <a16:creationId xmlns:a16="http://schemas.microsoft.com/office/drawing/2014/main" id="{B72DE30B-E5CF-7D36-ECD9-A95C44D11BDC}"/>
+                </a:ext>
+              </a:extLst>
+            </p:cNvPr>
+            <p:cNvGrpSpPr/>
+            <p:nvPr/>
+          </p:nvGrpSpPr>
+          <p:grpSpPr>
+            <a:xfrm>
+              <a:off x="4473258" y="245917"/>
+              <a:ext cx="1705213" cy="2086266"/>
+              <a:chOff x="2443043" y="245917"/>
+              <a:chExt cx="1705213" cy="2086266"/>
+            </a:xfrm>
+          </p:grpSpPr>
+          <p:pic>
+            <p:nvPicPr>
+              <p:cNvPr id="78" name="Picture 77">
+                <a:extLst>
+                  <a:ext uri="{FF2B5EF4-FFF2-40B4-BE49-F238E27FC236}">
+                    <a16:creationId xmlns:a16="http://schemas.microsoft.com/office/drawing/2014/main" id="{0C8F3604-AE28-383B-A6CD-F928B7432B07}"/>
+                  </a:ext>
+                </a:extLst>
+              </p:cNvPr>
+              <p:cNvPicPr>
+                <a:picLocks noChangeAspect="1"/>
+              </p:cNvPicPr>
+              <p:nvPr/>
+            </p:nvPicPr>
+            <p:blipFill>
+              <a:blip r:embed="rId2"/>
+              <a:stretch>
+                <a:fillRect/>
+              </a:stretch>
+            </p:blipFill>
+            <p:spPr>
+              <a:xfrm>
+                <a:off x="2443043" y="245917"/>
+                <a:ext cx="1705213" cy="2086266"/>
+              </a:xfrm>
+              <a:prstGeom prst="rect">
+                <a:avLst/>
+              </a:prstGeom>
+            </p:spPr>
+          </p:pic>
+          <p:sp>
+            <p:nvSpPr>
+              <p:cNvPr id="79" name="Rectangle 78">
+                <a:extLst>
+                  <a:ext uri="{FF2B5EF4-FFF2-40B4-BE49-F238E27FC236}">
+                    <a16:creationId xmlns:a16="http://schemas.microsoft.com/office/drawing/2014/main" id="{A86D223E-8D4A-18E3-1212-6B6C387D0498}"/>
+                  </a:ext>
+                </a:extLst>
+              </p:cNvPr>
+              <p:cNvSpPr/>
+              <p:nvPr/>
+            </p:nvSpPr>
+            <p:spPr>
+              <a:xfrm>
+                <a:off x="2584450" y="390246"/>
+                <a:ext cx="1401222" cy="1425853"/>
+              </a:xfrm>
+              <a:prstGeom prst="rect">
+                <a:avLst/>
+              </a:prstGeom>
+              <a:solidFill>
+                <a:schemeClr val="bg1"/>
+              </a:solidFill>
+              <a:ln>
+                <a:noFill/>
+              </a:ln>
+            </p:spPr>
+            <p:style>
+              <a:lnRef idx="2">
+                <a:schemeClr val="accent1">
+                  <a:shade val="15000"/>
+                </a:schemeClr>
+              </a:lnRef>
+              <a:fillRef idx="1">
+                <a:schemeClr val="accent1"/>
+              </a:fillRef>
+              <a:effectRef idx="0">
+                <a:schemeClr val="accent1"/>
+              </a:effectRef>
+              <a:fontRef idx="minor">
+                <a:schemeClr val="lt1"/>
+              </a:fontRef>
+            </p:style>
+            <p:txBody>
+              <a:bodyPr rtlCol="0" anchor="ctr"/>
+              <a:lstStyle/>
+              <a:p>
+                <a:pPr algn="ctr"/>
+                <a:endParaRPr lang="en-US" dirty="0"/>
+              </a:p>
+            </p:txBody>
+          </p:sp>
+          <p:sp>
+            <p:nvSpPr>
+              <p:cNvPr id="80" name="Rectangle 79">
+                <a:extLst>
+                  <a:ext uri="{FF2B5EF4-FFF2-40B4-BE49-F238E27FC236}">
+                    <a16:creationId xmlns:a16="http://schemas.microsoft.com/office/drawing/2014/main" id="{6595CFD7-4C72-25E6-94CD-75E6C71D84F6}"/>
+                  </a:ext>
+                </a:extLst>
+              </p:cNvPr>
+              <p:cNvSpPr/>
+              <p:nvPr/>
+            </p:nvSpPr>
+            <p:spPr>
+              <a:xfrm>
+                <a:off x="2665936" y="1962150"/>
+                <a:ext cx="1238250" cy="285750"/>
+              </a:xfrm>
+              <a:prstGeom prst="rect">
+                <a:avLst/>
+              </a:prstGeom>
+              <a:solidFill>
+                <a:schemeClr val="tx1"/>
+              </a:solidFill>
+              <a:ln>
+                <a:noFill/>
+              </a:ln>
+            </p:spPr>
+            <p:style>
+              <a:lnRef idx="2">
+                <a:schemeClr val="accent1">
+                  <a:shade val="15000"/>
+                </a:schemeClr>
+              </a:lnRef>
+              <a:fillRef idx="1">
+                <a:schemeClr val="accent1"/>
+              </a:fillRef>
+              <a:effectRef idx="0">
+                <a:schemeClr val="accent1"/>
+              </a:effectRef>
+              <a:fontRef idx="minor">
+                <a:schemeClr val="lt1"/>
+              </a:fontRef>
+            </p:style>
+            <p:txBody>
+              <a:bodyPr rtlCol="0" anchor="ctr"/>
+              <a:lstStyle/>
+              <a:p>
+                <a:pPr algn="ctr"/>
+                <a:r>
+                  <a:rPr lang="en-US" sz="2400" dirty="0"/>
+                  <a:t>Eat me</a:t>
+                </a:r>
+              </a:p>
+            </p:txBody>
+          </p:sp>
+        </p:grpSp>
+        <p:pic>
+          <p:nvPicPr>
+            <p:cNvPr id="44" name="Picture 43">
+              <a:extLst>
+                <a:ext uri="{FF2B5EF4-FFF2-40B4-BE49-F238E27FC236}">
+                  <a16:creationId xmlns:a16="http://schemas.microsoft.com/office/drawing/2014/main" id="{BF9BF88E-1800-6856-A45A-F4942CBE006B}"/>
+                </a:ext>
+              </a:extLst>
+            </p:cNvPr>
+            <p:cNvPicPr>
+              <a:picLocks noChangeAspect="1"/>
+            </p:cNvPicPr>
+            <p:nvPr/>
+          </p:nvPicPr>
+          <p:blipFill>
+            <a:blip r:embed="rId9">
+              <a:extLst>
+                <a:ext uri="{28A0092B-C50C-407E-A947-70E740481C1C}">
+                  <a14:useLocalDpi xmlns:a14="http://schemas.microsoft.com/office/drawing/2010/main" val="0"/>
+                </a:ext>
+              </a:extLst>
+            </a:blip>
+            <a:stretch>
+              <a:fillRect/>
+            </a:stretch>
+          </p:blipFill>
+          <p:spPr>
+            <a:xfrm>
+              <a:off x="4560862" y="356901"/>
+              <a:ext cx="1535138" cy="1535138"/>
+            </a:xfrm>
+            <a:prstGeom prst="rect">
+              <a:avLst/>
+            </a:prstGeom>
+          </p:spPr>
+        </p:pic>
+      </p:grpSp>
+      <p:grpSp>
+        <p:nvGrpSpPr>
+          <p:cNvPr id="83" name="Group 82">
+            <a:extLst>
+              <a:ext uri="{FF2B5EF4-FFF2-40B4-BE49-F238E27FC236}">
+                <a16:creationId xmlns:a16="http://schemas.microsoft.com/office/drawing/2014/main" id="{3A4201CF-B1E8-CD46-FDCF-01946B05276E}"/>
+              </a:ext>
+            </a:extLst>
+          </p:cNvPr>
+          <p:cNvGrpSpPr/>
+          <p:nvPr/>
+        </p:nvGrpSpPr>
+        <p:grpSpPr>
+          <a:xfrm rot="613420">
+            <a:off x="7696774" y="257259"/>
+            <a:ext cx="2187457" cy="3152855"/>
+            <a:chOff x="6508750" y="-192587"/>
+            <a:chExt cx="1907916" cy="2749943"/>
+          </a:xfrm>
+        </p:grpSpPr>
+        <p:grpSp>
+          <p:nvGrpSpPr>
+            <p:cNvPr id="67" name="Group 66">
+              <a:extLst>
+                <a:ext uri="{FF2B5EF4-FFF2-40B4-BE49-F238E27FC236}">
+                  <a16:creationId xmlns:a16="http://schemas.microsoft.com/office/drawing/2014/main" id="{CE2DDB35-D146-93DE-3E42-D323FE7E7BB3}"/>
+                </a:ext>
+              </a:extLst>
+            </p:cNvPr>
+            <p:cNvGrpSpPr/>
+            <p:nvPr/>
+          </p:nvGrpSpPr>
+          <p:grpSpPr>
+            <a:xfrm>
+              <a:off x="6508750" y="-192587"/>
+              <a:ext cx="1907916" cy="2749943"/>
+              <a:chOff x="8648700" y="-192586"/>
+              <a:chExt cx="1907916" cy="2749943"/>
+            </a:xfrm>
+          </p:grpSpPr>
+          <p:grpSp>
+            <p:nvGrpSpPr>
+              <p:cNvPr id="68" name="Group 67">
+                <a:extLst>
+                  <a:ext uri="{FF2B5EF4-FFF2-40B4-BE49-F238E27FC236}">
+                    <a16:creationId xmlns:a16="http://schemas.microsoft.com/office/drawing/2014/main" id="{3A2B2025-8648-8282-4E81-47A5F17ACABC}"/>
+                  </a:ext>
+                </a:extLst>
+              </p:cNvPr>
+              <p:cNvGrpSpPr/>
+              <p:nvPr/>
+            </p:nvGrpSpPr>
+            <p:grpSpPr>
+              <a:xfrm>
+                <a:off x="8648700" y="-192586"/>
+                <a:ext cx="1907916" cy="2749943"/>
+                <a:chOff x="9512695" y="1035051"/>
+                <a:chExt cx="1273231" cy="1835150"/>
+              </a:xfrm>
+            </p:grpSpPr>
+            <p:pic>
+              <p:nvPicPr>
+                <p:cNvPr id="70" name="Picture 69" descr="A qr code on a box&#10;&#10;AI-generated content may be incorrect.">
+                  <a:extLst>
+                    <a:ext uri="{FF2B5EF4-FFF2-40B4-BE49-F238E27FC236}">
+                      <a16:creationId xmlns:a16="http://schemas.microsoft.com/office/drawing/2014/main" id="{EFAF7D8F-D7D1-9668-77BD-6F599F3E8BED}"/>
+                    </a:ext>
+                  </a:extLst>
+                </p:cNvPr>
+                <p:cNvPicPr>
+                  <a:picLocks noChangeAspect="1"/>
+                </p:cNvPicPr>
+                <p:nvPr/>
+              </p:nvPicPr>
+              <p:blipFill>
+                <a:blip r:embed="rId10">
+                  <a:extLst>
+                    <a:ext uri="{28A0092B-C50C-407E-A947-70E740481C1C}">
+                      <a14:useLocalDpi xmlns:a14="http://schemas.microsoft.com/office/drawing/2010/main" val="0"/>
+                    </a:ext>
+                  </a:extLst>
+                </a:blip>
+                <a:stretch>
+                  <a:fillRect/>
+                </a:stretch>
+              </p:blipFill>
+              <p:spPr>
+                <a:xfrm>
+                  <a:off x="9512695" y="1035051"/>
+                  <a:ext cx="1273231" cy="1835150"/>
+                </a:xfrm>
+                <a:prstGeom prst="rect">
+                  <a:avLst/>
+                </a:prstGeom>
+              </p:spPr>
+            </p:pic>
+            <p:sp>
+              <p:nvSpPr>
+                <p:cNvPr id="71" name="Rectangle 70">
+                  <a:extLst>
+                    <a:ext uri="{FF2B5EF4-FFF2-40B4-BE49-F238E27FC236}">
+                      <a16:creationId xmlns:a16="http://schemas.microsoft.com/office/drawing/2014/main" id="{E99A0150-C870-C89B-AD6F-926F9DF96F29}"/>
+                    </a:ext>
+                  </a:extLst>
+                </p:cNvPr>
+                <p:cNvSpPr/>
+                <p:nvPr/>
+              </p:nvSpPr>
+              <p:spPr>
+                <a:xfrm>
+                  <a:off x="9613804" y="1419226"/>
+                  <a:ext cx="1071012" cy="285750"/>
+                </a:xfrm>
+                <a:prstGeom prst="rect">
+                  <a:avLst/>
+                </a:prstGeom>
+                <a:solidFill>
+                  <a:schemeClr val="tx1"/>
+                </a:solidFill>
+                <a:ln>
+                  <a:noFill/>
+                </a:ln>
+              </p:spPr>
+              <p:style>
+                <a:lnRef idx="2">
+                  <a:schemeClr val="accent1">
+                    <a:shade val="15000"/>
+                  </a:schemeClr>
+                </a:lnRef>
+                <a:fillRef idx="1">
+                  <a:schemeClr val="accent1"/>
+                </a:fillRef>
+                <a:effectRef idx="0">
+                  <a:schemeClr val="accent1"/>
+                </a:effectRef>
+                <a:fontRef idx="minor">
+                  <a:schemeClr val="lt1"/>
+                </a:fontRef>
+              </p:style>
+              <p:txBody>
+                <a:bodyPr rtlCol="0" anchor="ctr"/>
+                <a:lstStyle/>
+                <a:p>
+                  <a:pPr algn="ctr"/>
+                  <a:r>
+                    <a:rPr lang="en-US" sz="2000" i="1" dirty="0"/>
+                    <a:t>Eat me</a:t>
+                  </a:r>
+                </a:p>
+              </p:txBody>
+            </p:sp>
+          </p:grpSp>
+          <p:sp>
+            <p:nvSpPr>
+              <p:cNvPr id="69" name="Rectangle 68">
+                <a:extLst>
+                  <a:ext uri="{FF2B5EF4-FFF2-40B4-BE49-F238E27FC236}">
+                    <a16:creationId xmlns:a16="http://schemas.microsoft.com/office/drawing/2014/main" id="{3BBFD624-7D39-C086-00EA-5E2C3D7902FA}"/>
+                  </a:ext>
+                </a:extLst>
+              </p:cNvPr>
+              <p:cNvSpPr/>
+              <p:nvPr/>
+            </p:nvSpPr>
+            <p:spPr>
+              <a:xfrm>
+                <a:off x="8928240" y="1066522"/>
+                <a:ext cx="1348833" cy="1352550"/>
+              </a:xfrm>
+              <a:prstGeom prst="rect">
+                <a:avLst/>
+              </a:prstGeom>
+              <a:solidFill>
+                <a:schemeClr val="bg1"/>
+              </a:solidFill>
+              <a:ln>
+                <a:noFill/>
+              </a:ln>
+            </p:spPr>
+            <p:style>
+              <a:lnRef idx="2">
+                <a:schemeClr val="accent1">
+                  <a:shade val="15000"/>
+                </a:schemeClr>
+              </a:lnRef>
+              <a:fillRef idx="1">
+                <a:schemeClr val="accent1"/>
+              </a:fillRef>
+              <a:effectRef idx="0">
+                <a:schemeClr val="accent1"/>
+              </a:effectRef>
+              <a:fontRef idx="minor">
+                <a:schemeClr val="lt1"/>
+              </a:fontRef>
+            </p:style>
+            <p:txBody>
+              <a:bodyPr rtlCol="0" anchor="ctr"/>
+              <a:lstStyle/>
+              <a:p>
+                <a:pPr algn="ctr"/>
+                <a:endParaRPr lang="en-US"/>
+              </a:p>
+            </p:txBody>
+          </p:sp>
+        </p:grpSp>
+        <p:pic>
+          <p:nvPicPr>
+            <p:cNvPr id="46" name="Picture 45" descr="A qr code with a white background&#10;&#10;AI-generated content may be incorrect.">
+              <a:extLst>
+                <a:ext uri="{FF2B5EF4-FFF2-40B4-BE49-F238E27FC236}">
+                  <a16:creationId xmlns:a16="http://schemas.microsoft.com/office/drawing/2014/main" id="{0D77AA3E-C0D7-8833-9AA3-35B65E2A7043}"/>
+                </a:ext>
+              </a:extLst>
+            </p:cNvPr>
+            <p:cNvPicPr>
+              <a:picLocks noChangeAspect="1"/>
+            </p:cNvPicPr>
+            <p:nvPr/>
+          </p:nvPicPr>
+          <p:blipFill>
+            <a:blip r:embed="rId11">
+              <a:extLst>
+                <a:ext uri="{28A0092B-C50C-407E-A947-70E740481C1C}">
+                  <a14:useLocalDpi xmlns:a14="http://schemas.microsoft.com/office/drawing/2010/main" val="0"/>
+                </a:ext>
+              </a:extLst>
+            </a:blip>
+            <a:stretch>
+              <a:fillRect/>
+            </a:stretch>
+          </p:blipFill>
+          <p:spPr>
+            <a:xfrm>
+              <a:off x="6708233" y="981628"/>
+              <a:ext cx="1520272" cy="1520272"/>
+            </a:xfrm>
+            <a:prstGeom prst="rect">
+              <a:avLst/>
+            </a:prstGeom>
+          </p:spPr>
+        </p:pic>
+      </p:grpSp>
+      <p:grpSp>
+        <p:nvGrpSpPr>
+          <p:cNvPr id="85" name="Group 84">
+            <a:extLst>
+              <a:ext uri="{FF2B5EF4-FFF2-40B4-BE49-F238E27FC236}">
+                <a16:creationId xmlns:a16="http://schemas.microsoft.com/office/drawing/2014/main" id="{060E6B66-E1BC-8FD3-25FB-C2E047CCA90C}"/>
+              </a:ext>
+            </a:extLst>
+          </p:cNvPr>
+          <p:cNvGrpSpPr/>
+          <p:nvPr/>
+        </p:nvGrpSpPr>
+        <p:grpSpPr>
+          <a:xfrm rot="800106">
+            <a:off x="514147" y="2683374"/>
+            <a:ext cx="2031782" cy="3919308"/>
+            <a:chOff x="429442" y="2557357"/>
+            <a:chExt cx="1666137" cy="3213979"/>
+          </a:xfrm>
+        </p:grpSpPr>
+        <p:grpSp>
+          <p:nvGrpSpPr>
+            <p:cNvPr id="59" name="Group 58">
+              <a:extLst>
+                <a:ext uri="{FF2B5EF4-FFF2-40B4-BE49-F238E27FC236}">
+                  <a16:creationId xmlns:a16="http://schemas.microsoft.com/office/drawing/2014/main" id="{15AE715C-5031-3F8E-983F-EA53EA7BBB1A}"/>
+                </a:ext>
+              </a:extLst>
+            </p:cNvPr>
+            <p:cNvGrpSpPr/>
+            <p:nvPr/>
+          </p:nvGrpSpPr>
+          <p:grpSpPr>
+            <a:xfrm>
+              <a:off x="429442" y="2557357"/>
+              <a:ext cx="1666137" cy="3213979"/>
+              <a:chOff x="429442" y="2557357"/>
+              <a:chExt cx="1666137" cy="3213979"/>
+            </a:xfrm>
+          </p:grpSpPr>
+          <p:grpSp>
+            <p:nvGrpSpPr>
+              <p:cNvPr id="33" name="Group 32">
+                <a:extLst>
+                  <a:ext uri="{FF2B5EF4-FFF2-40B4-BE49-F238E27FC236}">
+                    <a16:creationId xmlns:a16="http://schemas.microsoft.com/office/drawing/2014/main" id="{05BC2BB2-1846-D133-481B-6AD04E034AB9}"/>
+                  </a:ext>
+                </a:extLst>
+              </p:cNvPr>
+              <p:cNvGrpSpPr/>
+              <p:nvPr/>
+            </p:nvGrpSpPr>
+            <p:grpSpPr>
+              <a:xfrm>
+                <a:off x="429442" y="2557357"/>
+                <a:ext cx="1666137" cy="3213979"/>
+                <a:chOff x="4318395" y="0"/>
+                <a:chExt cx="1530715" cy="2952750"/>
+              </a:xfrm>
+            </p:grpSpPr>
+            <p:pic>
+              <p:nvPicPr>
+                <p:cNvPr id="12" name="Picture 11" descr="A qr code with a leaf&#10;&#10;AI-generated content may be incorrect.">
+                  <a:extLst>
+                    <a:ext uri="{FF2B5EF4-FFF2-40B4-BE49-F238E27FC236}">
+                      <a16:creationId xmlns:a16="http://schemas.microsoft.com/office/drawing/2014/main" id="{68C92930-62C0-0131-4880-4C0EFE009D00}"/>
+                    </a:ext>
+                  </a:extLst>
+                </p:cNvPr>
+                <p:cNvPicPr>
+                  <a:picLocks noChangeAspect="1"/>
+                </p:cNvPicPr>
+                <p:nvPr/>
+              </p:nvPicPr>
+              <p:blipFill>
+                <a:blip r:embed="rId12">
+                  <a:extLst>
+                    <a:ext uri="{28A0092B-C50C-407E-A947-70E740481C1C}">
+                      <a14:useLocalDpi xmlns:a14="http://schemas.microsoft.com/office/drawing/2010/main" val="0"/>
+                    </a:ext>
+                  </a:extLst>
+                </a:blip>
+                <a:stretch>
+                  <a:fillRect/>
+                </a:stretch>
+              </p:blipFill>
+              <p:spPr>
+                <a:xfrm>
+                  <a:off x="4318395" y="0"/>
+                  <a:ext cx="1530715" cy="2952750"/>
+                </a:xfrm>
+                <a:prstGeom prst="rect">
+                  <a:avLst/>
+                </a:prstGeom>
+              </p:spPr>
+            </p:pic>
+            <p:sp>
+              <p:nvSpPr>
+                <p:cNvPr id="28" name="Rectangle 27">
+                  <a:extLst>
+                    <a:ext uri="{FF2B5EF4-FFF2-40B4-BE49-F238E27FC236}">
+                      <a16:creationId xmlns:a16="http://schemas.microsoft.com/office/drawing/2014/main" id="{78FA8493-2C53-D0C9-4273-6BFD522274FA}"/>
+                    </a:ext>
+                  </a:extLst>
+                </p:cNvPr>
+                <p:cNvSpPr/>
+                <p:nvPr/>
+              </p:nvSpPr>
+              <p:spPr>
+                <a:xfrm>
+                  <a:off x="4464627" y="2584451"/>
+                  <a:ext cx="1238250" cy="285750"/>
+                </a:xfrm>
+                <a:prstGeom prst="rect">
+                  <a:avLst/>
+                </a:prstGeom>
+                <a:solidFill>
+                  <a:schemeClr val="tx1"/>
+                </a:solidFill>
+                <a:ln>
+                  <a:noFill/>
+                </a:ln>
+              </p:spPr>
+              <p:style>
+                <a:lnRef idx="2">
+                  <a:schemeClr val="accent1">
+                    <a:shade val="15000"/>
+                  </a:schemeClr>
+                </a:lnRef>
+                <a:fillRef idx="1">
+                  <a:schemeClr val="accent1"/>
+                </a:fillRef>
+                <a:effectRef idx="0">
+                  <a:schemeClr val="accent1"/>
+                </a:effectRef>
+                <a:fontRef idx="minor">
+                  <a:schemeClr val="lt1"/>
+                </a:fontRef>
+              </p:style>
+              <p:txBody>
+                <a:bodyPr rtlCol="0" anchor="ctr"/>
+                <a:lstStyle/>
+                <a:p>
+                  <a:pPr algn="ctr"/>
+                  <a:r>
+                    <a:rPr lang="en-US" sz="2400" dirty="0"/>
+                    <a:t>Eat me</a:t>
+                  </a:r>
+                </a:p>
+              </p:txBody>
+            </p:sp>
+          </p:grpSp>
+          <p:sp>
+            <p:nvSpPr>
+              <p:cNvPr id="56" name="Rectangle 55">
+                <a:extLst>
+                  <a:ext uri="{FF2B5EF4-FFF2-40B4-BE49-F238E27FC236}">
+                    <a16:creationId xmlns:a16="http://schemas.microsoft.com/office/drawing/2014/main" id="{A4A32CDF-ED03-03D9-8E09-45F26867C1D2}"/>
+                  </a:ext>
+                </a:extLst>
+              </p:cNvPr>
+              <p:cNvSpPr/>
+              <p:nvPr/>
+            </p:nvSpPr>
+            <p:spPr>
+              <a:xfrm>
+                <a:off x="507210" y="3843690"/>
+                <a:ext cx="1501095" cy="1352550"/>
+              </a:xfrm>
+              <a:prstGeom prst="rect">
+                <a:avLst/>
+              </a:prstGeom>
+              <a:solidFill>
+                <a:schemeClr val="bg1"/>
+              </a:solidFill>
+              <a:ln>
+                <a:noFill/>
+              </a:ln>
+            </p:spPr>
+            <p:style>
+              <a:lnRef idx="2">
+                <a:schemeClr val="accent1">
+                  <a:shade val="15000"/>
+                </a:schemeClr>
+              </a:lnRef>
+              <a:fillRef idx="1">
+                <a:schemeClr val="accent1"/>
+              </a:fillRef>
+              <a:effectRef idx="0">
+                <a:schemeClr val="accent1"/>
+              </a:effectRef>
+              <a:fontRef idx="minor">
+                <a:schemeClr val="lt1"/>
+              </a:fontRef>
+            </p:style>
+            <p:txBody>
+              <a:bodyPr rtlCol="0" anchor="ctr"/>
+              <a:lstStyle/>
+              <a:p>
+                <a:pPr algn="ctr"/>
+                <a:endParaRPr lang="en-US" dirty="0"/>
+              </a:p>
+            </p:txBody>
+          </p:sp>
+        </p:grpSp>
+        <p:pic>
+          <p:nvPicPr>
+            <p:cNvPr id="48" name="Picture 47" descr="A qr code with a white background&#10;&#10;AI-generated content may be incorrect.">
+              <a:extLst>
+                <a:ext uri="{FF2B5EF4-FFF2-40B4-BE49-F238E27FC236}">
+                  <a16:creationId xmlns:a16="http://schemas.microsoft.com/office/drawing/2014/main" id="{6E90FD03-33A0-82D1-2CCA-C3E18295C56E}"/>
+                </a:ext>
+              </a:extLst>
+            </p:cNvPr>
+            <p:cNvPicPr>
+              <a:picLocks noChangeAspect="1"/>
+            </p:cNvPicPr>
+            <p:nvPr/>
+          </p:nvPicPr>
+          <p:blipFill>
+            <a:blip r:embed="rId13">
+              <a:extLst>
+                <a:ext uri="{28A0092B-C50C-407E-A947-70E740481C1C}">
+                  <a14:useLocalDpi xmlns:a14="http://schemas.microsoft.com/office/drawing/2010/main" val="0"/>
+                </a:ext>
+              </a:extLst>
+            </a:blip>
+            <a:stretch>
+              <a:fillRect/>
+            </a:stretch>
+          </p:blipFill>
+          <p:spPr>
+            <a:xfrm>
+              <a:off x="503343" y="3787139"/>
+              <a:ext cx="1504962" cy="1504962"/>
+            </a:xfrm>
+            <a:prstGeom prst="rect">
+              <a:avLst/>
+            </a:prstGeom>
+          </p:spPr>
+        </p:pic>
+      </p:grpSp>
+      <p:pic>
+        <p:nvPicPr>
+          <p:cNvPr id="50" name="Picture 49" descr="A qr code with a white background&#10;&#10;AI-generated content may be incorrect.">
+            <a:extLst>
+              <a:ext uri="{FF2B5EF4-FFF2-40B4-BE49-F238E27FC236}">
+                <a16:creationId xmlns:a16="http://schemas.microsoft.com/office/drawing/2014/main" id="{97F6E880-6A2F-0624-D6E0-DA01B1998734}"/>
+              </a:ext>
+            </a:extLst>
+          </p:cNvPr>
+          <p:cNvPicPr>
+            <a:picLocks noChangeAspect="1"/>
+          </p:cNvPicPr>
+          <p:nvPr/>
+        </p:nvPicPr>
+        <p:blipFill>
+          <a:blip r:embed="rId14">
+            <a:extLst>
+              <a:ext uri="{28A0092B-C50C-407E-A947-70E740481C1C}">
+                <a14:useLocalDpi xmlns:a14="http://schemas.microsoft.com/office/drawing/2010/main" val="0"/>
+              </a:ext>
+            </a:extLst>
+          </a:blip>
+          <a:stretch>
+            <a:fillRect/>
+          </a:stretch>
+        </p:blipFill>
+        <p:spPr>
+          <a:xfrm rot="2700000">
+            <a:off x="7710366" y="4707625"/>
+            <a:ext cx="1722480" cy="1722480"/>
+          </a:xfrm>
+          <a:prstGeom prst="rect">
+            <a:avLst/>
+          </a:prstGeom>
+        </p:spPr>
+      </p:pic>
+      <p:grpSp>
+        <p:nvGrpSpPr>
+          <p:cNvPr id="86" name="Group 85">
+            <a:extLst>
+              <a:ext uri="{FF2B5EF4-FFF2-40B4-BE49-F238E27FC236}">
+                <a16:creationId xmlns:a16="http://schemas.microsoft.com/office/drawing/2014/main" id="{AC49C44E-22C6-22CE-5367-105C4B25075C}"/>
+              </a:ext>
+            </a:extLst>
+          </p:cNvPr>
+          <p:cNvGrpSpPr/>
+          <p:nvPr/>
+        </p:nvGrpSpPr>
+        <p:grpSpPr>
+          <a:xfrm rot="20857386">
+            <a:off x="9737663" y="3255132"/>
+            <a:ext cx="1666137" cy="3213979"/>
+            <a:chOff x="2451992" y="2608354"/>
+            <a:chExt cx="1666137" cy="3213979"/>
+          </a:xfrm>
+        </p:grpSpPr>
+        <p:grpSp>
+          <p:nvGrpSpPr>
+            <p:cNvPr id="72" name="Group 71">
+              <a:extLst>
+                <a:ext uri="{FF2B5EF4-FFF2-40B4-BE49-F238E27FC236}">
+                  <a16:creationId xmlns:a16="http://schemas.microsoft.com/office/drawing/2014/main" id="{3AB0D0FB-32FF-0A38-5BFE-2A02A854567A}"/>
+                </a:ext>
+              </a:extLst>
+            </p:cNvPr>
+            <p:cNvGrpSpPr/>
+            <p:nvPr/>
+          </p:nvGrpSpPr>
+          <p:grpSpPr>
+            <a:xfrm>
+              <a:off x="2451992" y="2608354"/>
+              <a:ext cx="1666137" cy="3213979"/>
+              <a:chOff x="429442" y="2557357"/>
+              <a:chExt cx="1666137" cy="3213979"/>
+            </a:xfrm>
+          </p:grpSpPr>
+          <p:grpSp>
+            <p:nvGrpSpPr>
+              <p:cNvPr id="73" name="Group 72">
+                <a:extLst>
+                  <a:ext uri="{FF2B5EF4-FFF2-40B4-BE49-F238E27FC236}">
+                    <a16:creationId xmlns:a16="http://schemas.microsoft.com/office/drawing/2014/main" id="{A001F8B4-7C12-4295-3125-7907602FC789}"/>
+                  </a:ext>
+                </a:extLst>
+              </p:cNvPr>
+              <p:cNvGrpSpPr/>
+              <p:nvPr/>
+            </p:nvGrpSpPr>
+            <p:grpSpPr>
+              <a:xfrm>
+                <a:off x="429442" y="2557357"/>
+                <a:ext cx="1666137" cy="3213979"/>
+                <a:chOff x="4318395" y="0"/>
+                <a:chExt cx="1530715" cy="2952750"/>
+              </a:xfrm>
+            </p:grpSpPr>
+            <p:pic>
+              <p:nvPicPr>
+                <p:cNvPr id="75" name="Picture 74" descr="A qr code with a leaf&#10;&#10;AI-generated content may be incorrect.">
+                  <a:extLst>
+                    <a:ext uri="{FF2B5EF4-FFF2-40B4-BE49-F238E27FC236}">
+                      <a16:creationId xmlns:a16="http://schemas.microsoft.com/office/drawing/2014/main" id="{6A43743C-EDC7-B67B-1D69-9849DF2FFCE7}"/>
+                    </a:ext>
+                  </a:extLst>
+                </p:cNvPr>
+                <p:cNvPicPr>
+                  <a:picLocks noChangeAspect="1"/>
+                </p:cNvPicPr>
+                <p:nvPr/>
+              </p:nvPicPr>
+              <p:blipFill>
+                <a:blip r:embed="rId12">
+                  <a:extLst>
+                    <a:ext uri="{28A0092B-C50C-407E-A947-70E740481C1C}">
+                      <a14:useLocalDpi xmlns:a14="http://schemas.microsoft.com/office/drawing/2010/main" val="0"/>
+                    </a:ext>
+                  </a:extLst>
+                </a:blip>
+                <a:stretch>
+                  <a:fillRect/>
+                </a:stretch>
+              </p:blipFill>
+              <p:spPr>
+                <a:xfrm>
+                  <a:off x="4318395" y="0"/>
+                  <a:ext cx="1530715" cy="2952750"/>
+                </a:xfrm>
+                <a:prstGeom prst="rect">
+                  <a:avLst/>
+                </a:prstGeom>
+              </p:spPr>
+            </p:pic>
+            <p:sp>
+              <p:nvSpPr>
+                <p:cNvPr id="76" name="Rectangle 75">
+                  <a:extLst>
+                    <a:ext uri="{FF2B5EF4-FFF2-40B4-BE49-F238E27FC236}">
+                      <a16:creationId xmlns:a16="http://schemas.microsoft.com/office/drawing/2014/main" id="{D6FA93B3-7681-86A9-40B5-5870ED5DDFB4}"/>
+                    </a:ext>
+                  </a:extLst>
+                </p:cNvPr>
+                <p:cNvSpPr/>
+                <p:nvPr/>
+              </p:nvSpPr>
+              <p:spPr>
+                <a:xfrm>
+                  <a:off x="4464627" y="2584451"/>
+                  <a:ext cx="1238250" cy="285750"/>
+                </a:xfrm>
+                <a:prstGeom prst="rect">
+                  <a:avLst/>
+                </a:prstGeom>
+                <a:solidFill>
+                  <a:schemeClr val="tx1"/>
+                </a:solidFill>
+                <a:ln>
+                  <a:noFill/>
+                </a:ln>
+              </p:spPr>
+              <p:style>
+                <a:lnRef idx="2">
+                  <a:schemeClr val="accent1">
+                    <a:shade val="15000"/>
+                  </a:schemeClr>
+                </a:lnRef>
+                <a:fillRef idx="1">
+                  <a:schemeClr val="accent1"/>
+                </a:fillRef>
+                <a:effectRef idx="0">
+                  <a:schemeClr val="accent1"/>
+                </a:effectRef>
+                <a:fontRef idx="minor">
+                  <a:schemeClr val="lt1"/>
+                </a:fontRef>
+              </p:style>
+              <p:txBody>
+                <a:bodyPr rtlCol="0" anchor="ctr"/>
+                <a:lstStyle/>
+                <a:p>
+                  <a:pPr algn="ctr"/>
+                  <a:r>
+                    <a:rPr lang="en-US" sz="2400" dirty="0"/>
+                    <a:t>Eat me</a:t>
+                  </a:r>
+                </a:p>
+              </p:txBody>
+            </p:sp>
+          </p:grpSp>
+          <p:sp>
+            <p:nvSpPr>
+              <p:cNvPr id="74" name="Rectangle 73">
+                <a:extLst>
+                  <a:ext uri="{FF2B5EF4-FFF2-40B4-BE49-F238E27FC236}">
+                    <a16:creationId xmlns:a16="http://schemas.microsoft.com/office/drawing/2014/main" id="{4CA53C5C-1989-05E4-488B-3A485398B9E5}"/>
+                  </a:ext>
+                </a:extLst>
+              </p:cNvPr>
+              <p:cNvSpPr/>
+              <p:nvPr/>
+            </p:nvSpPr>
+            <p:spPr>
+              <a:xfrm>
+                <a:off x="507210" y="3843690"/>
+                <a:ext cx="1501095" cy="1352550"/>
+              </a:xfrm>
+              <a:prstGeom prst="rect">
+                <a:avLst/>
+              </a:prstGeom>
+              <a:solidFill>
+                <a:schemeClr val="bg1"/>
+              </a:solidFill>
+              <a:ln>
+                <a:noFill/>
+              </a:ln>
+            </p:spPr>
+            <p:style>
+              <a:lnRef idx="2">
+                <a:schemeClr val="accent1">
+                  <a:shade val="15000"/>
+                </a:schemeClr>
+              </a:lnRef>
+              <a:fillRef idx="1">
+                <a:schemeClr val="accent1"/>
+              </a:fillRef>
+              <a:effectRef idx="0">
+                <a:schemeClr val="accent1"/>
+              </a:effectRef>
+              <a:fontRef idx="minor">
+                <a:schemeClr val="lt1"/>
+              </a:fontRef>
+            </p:style>
+            <p:txBody>
+              <a:bodyPr rtlCol="0" anchor="ctr"/>
+              <a:lstStyle/>
+              <a:p>
+                <a:pPr algn="ctr"/>
+                <a:endParaRPr lang="en-US" dirty="0"/>
+              </a:p>
+            </p:txBody>
+          </p:sp>
+        </p:grpSp>
+        <p:pic>
+          <p:nvPicPr>
+            <p:cNvPr id="52" name="Picture 51" descr="A qr code with a white background&#10;&#10;AI-generated content may be incorrect.">
+              <a:extLst>
+                <a:ext uri="{FF2B5EF4-FFF2-40B4-BE49-F238E27FC236}">
+                  <a16:creationId xmlns:a16="http://schemas.microsoft.com/office/drawing/2014/main" id="{FFA23F08-2D4A-1BD9-D84B-FD2FA9A60AC7}"/>
+                </a:ext>
+              </a:extLst>
+            </p:cNvPr>
+            <p:cNvPicPr>
+              <a:picLocks noChangeAspect="1"/>
+            </p:cNvPicPr>
+            <p:nvPr/>
+          </p:nvPicPr>
+          <p:blipFill>
+            <a:blip r:embed="rId15">
+              <a:extLst>
+                <a:ext uri="{28A0092B-C50C-407E-A947-70E740481C1C}">
+                  <a14:useLocalDpi xmlns:a14="http://schemas.microsoft.com/office/drawing/2010/main" val="0"/>
+                </a:ext>
+              </a:extLst>
+            </a:blip>
+            <a:stretch>
+              <a:fillRect/>
+            </a:stretch>
+          </p:blipFill>
+          <p:spPr>
+            <a:xfrm>
+              <a:off x="2525892" y="3816547"/>
+              <a:ext cx="1525833" cy="1525833"/>
+            </a:xfrm>
+            <a:prstGeom prst="rect">
+              <a:avLst/>
+            </a:prstGeom>
+          </p:spPr>
+        </p:pic>
+      </p:grpSp>
+    </p:spTree>
+    <p:extLst>
+      <p:ext uri="{BB962C8B-B14F-4D97-AF65-F5344CB8AC3E}">
+        <p14:creationId xmlns:p14="http://schemas.microsoft.com/office/powerpoint/2010/main" val="445842552"/>
+      </p:ext>
+    </p:extLst>
+  </p:cSld>
+  <p:clrMapOvr>
+    <a:masterClrMapping/>
+  </p:clrMapOvr>
+</p:sld>
+</file>
+
+<file path=ppt/slides/slide2.xml><?xml version="1.0" encoding="utf-8"?>
 <p:sld xmlns:a="http://schemas.openxmlformats.org/drawingml/2006/main" xmlns:r="http://schemas.openxmlformats.org/officeDocument/2006/relationships" xmlns:p="http://schemas.openxmlformats.org/presentationml/2006/main">
   <p:cSld>
     <p:spTree>

</xml_diff>